<commit_message>
feedback on poster slide
</commit_message>
<xml_diff>
--- a/Report/SURE_Poster.pptx
+++ b/Report/SURE_Poster.pptx
@@ -243,7 +243,7 @@
           <a:p>
             <a:fld id="{4AAD5197-33D8-404B-BB46-46338D5CAA86}" type="datetimeFigureOut">
               <a:rPr lang="en-US" smtClean="0"/>
-              <a:t>8/5/2025</a:t>
+              <a:t>8/8/2025</a:t>
             </a:fld>
             <a:endParaRPr lang="en-US"/>
           </a:p>
@@ -413,7 +413,7 @@
           <a:p>
             <a:fld id="{4AAD5197-33D8-404B-BB46-46338D5CAA86}" type="datetimeFigureOut">
               <a:rPr lang="en-US" smtClean="0"/>
-              <a:t>8/5/2025</a:t>
+              <a:t>8/8/2025</a:t>
             </a:fld>
             <a:endParaRPr lang="en-US"/>
           </a:p>
@@ -593,7 +593,7 @@
           <a:p>
             <a:fld id="{4AAD5197-33D8-404B-BB46-46338D5CAA86}" type="datetimeFigureOut">
               <a:rPr lang="en-US" smtClean="0"/>
-              <a:t>8/5/2025</a:t>
+              <a:t>8/8/2025</a:t>
             </a:fld>
             <a:endParaRPr lang="en-US"/>
           </a:p>
@@ -763,7 +763,7 @@
           <a:p>
             <a:fld id="{4AAD5197-33D8-404B-BB46-46338D5CAA86}" type="datetimeFigureOut">
               <a:rPr lang="en-US" smtClean="0"/>
-              <a:t>8/5/2025</a:t>
+              <a:t>8/8/2025</a:t>
             </a:fld>
             <a:endParaRPr lang="en-US"/>
           </a:p>
@@ -1009,7 +1009,7 @@
           <a:p>
             <a:fld id="{4AAD5197-33D8-404B-BB46-46338D5CAA86}" type="datetimeFigureOut">
               <a:rPr lang="en-US" smtClean="0"/>
-              <a:t>8/5/2025</a:t>
+              <a:t>8/8/2025</a:t>
             </a:fld>
             <a:endParaRPr lang="en-US"/>
           </a:p>
@@ -1241,7 +1241,7 @@
           <a:p>
             <a:fld id="{4AAD5197-33D8-404B-BB46-46338D5CAA86}" type="datetimeFigureOut">
               <a:rPr lang="en-US" smtClean="0"/>
-              <a:t>8/5/2025</a:t>
+              <a:t>8/8/2025</a:t>
             </a:fld>
             <a:endParaRPr lang="en-US"/>
           </a:p>
@@ -1608,7 +1608,7 @@
           <a:p>
             <a:fld id="{4AAD5197-33D8-404B-BB46-46338D5CAA86}" type="datetimeFigureOut">
               <a:rPr lang="en-US" smtClean="0"/>
-              <a:t>8/5/2025</a:t>
+              <a:t>8/8/2025</a:t>
             </a:fld>
             <a:endParaRPr lang="en-US"/>
           </a:p>
@@ -1726,7 +1726,7 @@
           <a:p>
             <a:fld id="{4AAD5197-33D8-404B-BB46-46338D5CAA86}" type="datetimeFigureOut">
               <a:rPr lang="en-US" smtClean="0"/>
-              <a:t>8/5/2025</a:t>
+              <a:t>8/8/2025</a:t>
             </a:fld>
             <a:endParaRPr lang="en-US"/>
           </a:p>
@@ -1821,7 +1821,7 @@
           <a:p>
             <a:fld id="{4AAD5197-33D8-404B-BB46-46338D5CAA86}" type="datetimeFigureOut">
               <a:rPr lang="en-US" smtClean="0"/>
-              <a:t>8/5/2025</a:t>
+              <a:t>8/8/2025</a:t>
             </a:fld>
             <a:endParaRPr lang="en-US"/>
           </a:p>
@@ -2098,7 +2098,7 @@
           <a:p>
             <a:fld id="{4AAD5197-33D8-404B-BB46-46338D5CAA86}" type="datetimeFigureOut">
               <a:rPr lang="en-US" smtClean="0"/>
-              <a:t>8/5/2025</a:t>
+              <a:t>8/8/2025</a:t>
             </a:fld>
             <a:endParaRPr lang="en-US"/>
           </a:p>
@@ -2355,7 +2355,7 @@
           <a:p>
             <a:fld id="{4AAD5197-33D8-404B-BB46-46338D5CAA86}" type="datetimeFigureOut">
               <a:rPr lang="en-US" smtClean="0"/>
-              <a:t>8/5/2025</a:t>
+              <a:t>8/8/2025</a:t>
             </a:fld>
             <a:endParaRPr lang="en-US"/>
           </a:p>
@@ -2568,7 +2568,7 @@
           <a:p>
             <a:fld id="{4AAD5197-33D8-404B-BB46-46338D5CAA86}" type="datetimeFigureOut">
               <a:rPr lang="en-US" smtClean="0"/>
-              <a:t>8/5/2025</a:t>
+              <a:t>8/8/2025</a:t>
             </a:fld>
             <a:endParaRPr lang="en-US"/>
           </a:p>
@@ -3290,22 +3290,13 @@
           <a:p>
             <a:pPr algn="ctr"/>
             <a:r>
-              <a:rPr lang="en-US" sz="6000" b="1" dirty="0" err="1">
-                <a:solidFill>
-                  <a:schemeClr val="bg1"/>
-                </a:solidFill>
-                <a:latin typeface="+mj-lt"/>
-              </a:rPr>
-              <a:t>StatiCAN</a:t>
-            </a:r>
-            <a:r>
               <a:rPr lang="en-US" sz="6000" b="1" dirty="0">
                 <a:solidFill>
                   <a:schemeClr val="bg1"/>
                 </a:solidFill>
                 <a:latin typeface="+mj-lt"/>
               </a:rPr>
-              <a:t>: Static Analysis Tools for Developing and Debugging CAN-Based Communication Systems</a:t>
+              <a:t>Patterns and Pitfalls: Empirical Insights into CAN Bus Bugs in Open-Source Repositories</a:t>
             </a:r>
           </a:p>
           <a:p>
@@ -3317,7 +3308,25 @@
                 </a:solidFill>
                 <a:latin typeface="+mj-lt"/>
               </a:rPr>
-              <a:t>Michael Gharbieh, Dr. Foyzul Hassan, Dr. Bruce Maxim</a:t>
+              <a:t>Michael </a:t>
+            </a:r>
+            <a:r>
+              <a:rPr lang="en-US" sz="5400" dirty="0" err="1">
+                <a:solidFill>
+                  <a:schemeClr val="bg1"/>
+                </a:solidFill>
+                <a:latin typeface="+mj-lt"/>
+              </a:rPr>
+              <a:t>Gharbieh</a:t>
+            </a:r>
+            <a:r>
+              <a:rPr lang="en-US" sz="5400" dirty="0">
+                <a:solidFill>
+                  <a:schemeClr val="bg1"/>
+                </a:solidFill>
+                <a:latin typeface="+mj-lt"/>
+              </a:rPr>
+              <a:t>, Dr. Foyzul Hassan, Dr. Bruce Maxim</a:t>
             </a:r>
           </a:p>
           <a:p>
@@ -4695,7 +4704,7 @@
                   <a:schemeClr val="bg1"/>
                 </a:solidFill>
               </a:rPr>
-              <a:t>Conclusion</a:t>
+              <a:t>Conclusion &amp; Future Work</a:t>
             </a:r>
           </a:p>
         </p:txBody>
@@ -4874,8 +4883,12 @@
           <a:lstStyle/>
           <a:p>
             <a:r>
-              <a:rPr lang="en-US" sz="4000" dirty="0"/>
-              <a:t>This is filler text </a:t>
+              <a:rPr lang="en-US" sz="4000" dirty="0">
+                <a:solidFill>
+                  <a:srgbClr val="FF0000"/>
+                </a:solidFill>
+              </a:rPr>
+              <a:t>Include summary of empirical analysis outcome a bullet point </a:t>
             </a:r>
           </a:p>
           <a:p>
@@ -4911,8 +4924,8 @@
         </p:nvSpPr>
         <p:spPr>
           <a:xfrm>
-            <a:off x="9772889" y="27321206"/>
-            <a:ext cx="17659110" cy="3170099"/>
+            <a:off x="9683681" y="27321206"/>
+            <a:ext cx="17659110" cy="3785652"/>
           </a:xfrm>
           <a:prstGeom prst="rect">
             <a:avLst/>
@@ -4927,7 +4940,7 @@
           <a:p>
             <a:r>
               <a:rPr lang="en-US" sz="4000" dirty="0"/>
-              <a:t>This is filler text </a:t>
+              <a:t>Discuss summary of the work and include some future work directions that we want to develop statis analyzer for detecting these problems.</a:t>
             </a:r>
           </a:p>
           <a:p>
@@ -4964,7 +4977,7 @@
         <p:spPr>
           <a:xfrm>
             <a:off x="9845144" y="5989281"/>
-            <a:ext cx="17659110" cy="5734903"/>
+            <a:ext cx="17659110" cy="6288901"/>
           </a:xfrm>
           <a:prstGeom prst="rect">
             <a:avLst/>
@@ -5044,8 +5057,12 @@
               <a:buAutoNum type="arabicPeriod"/>
             </a:pPr>
             <a:r>
-              <a:rPr lang="en-US" sz="3600" dirty="0"/>
-              <a:t>An AST (Abstract Syntax Tree) was generated for the source code which the commits were working on to be used for common pattern prediction.</a:t>
+              <a:rPr lang="en-US" sz="3600" dirty="0">
+                <a:solidFill>
+                  <a:srgbClr val="FF0000"/>
+                </a:solidFill>
+              </a:rPr>
+              <a:t>An AST (Abstract Syntax Tree) was generated for the source code which the commits were working on to be used for common pattern prediction. (For SURE elaborate more on empirical part)</a:t>
             </a:r>
           </a:p>
           <a:p>
@@ -5360,7 +5377,7 @@
         </p:blipFill>
         <p:spPr>
           <a:xfrm>
-            <a:off x="28750485" y="6235817"/>
+            <a:off x="28957004" y="17398763"/>
             <a:ext cx="14066588" cy="6361773"/>
           </a:xfrm>
           <a:prstGeom prst="rect">
@@ -5387,7 +5404,7 @@
         </p:nvSpPr>
         <p:spPr>
           <a:xfrm>
-            <a:off x="28750485" y="12597590"/>
+            <a:off x="30513971" y="23915054"/>
             <a:ext cx="14066588" cy="523220"/>
           </a:xfrm>
           <a:prstGeom prst="rect">
@@ -5403,7 +5420,76 @@
           <a:p>
             <a:r>
               <a:rPr lang="en-US" sz="2800" dirty="0"/>
-              <a:t>Figure 1: Taxonomy of bug categories with bug count per category</a:t>
+              <a:t>Figure 2: Taxonomy of bug categories with bug count per category</a:t>
+            </a:r>
+          </a:p>
+        </p:txBody>
+      </p:sp>
+      <p:pic>
+        <p:nvPicPr>
+          <p:cNvPr id="4" name="Picture 3">
+            <a:extLst>
+              <a:ext uri="{FF2B5EF4-FFF2-40B4-BE49-F238E27FC236}">
+                <a16:creationId xmlns:a16="http://schemas.microsoft.com/office/drawing/2014/main" id="{EC46A3E4-9D5F-248B-C6CD-0F1E607A7F95}"/>
+              </a:ext>
+            </a:extLst>
+          </p:cNvPr>
+          <p:cNvPicPr>
+            <a:picLocks noChangeAspect="1"/>
+          </p:cNvPicPr>
+          <p:nvPr/>
+        </p:nvPicPr>
+        <p:blipFill>
+          <a:blip r:embed="rId6"/>
+          <a:stretch>
+            <a:fillRect/>
+          </a:stretch>
+        </p:blipFill>
+        <p:spPr>
+          <a:xfrm>
+            <a:off x="31432680" y="6503970"/>
+            <a:ext cx="8351520" cy="7855697"/>
+          </a:xfrm>
+          <a:prstGeom prst="rect">
+            <a:avLst/>
+          </a:prstGeom>
+        </p:spPr>
+      </p:pic>
+      <p:sp>
+        <p:nvSpPr>
+          <p:cNvPr id="32" name="TextBox 31">
+            <a:extLst>
+              <a:ext uri="{FF2B5EF4-FFF2-40B4-BE49-F238E27FC236}">
+                <a16:creationId xmlns:a16="http://schemas.microsoft.com/office/drawing/2014/main" id="{A4599B92-563E-5442-4888-AF8B30AF7CE0}"/>
+              </a:ext>
+            </a:extLst>
+          </p:cNvPr>
+          <p:cNvSpPr txBox="1"/>
+          <p:nvPr/>
+        </p:nvSpPr>
+        <p:spPr>
+          <a:xfrm>
+            <a:off x="33798711" y="14766248"/>
+            <a:ext cx="6924746" cy="1384995"/>
+          </a:xfrm>
+          <a:prstGeom prst="rect">
+            <a:avLst/>
+          </a:prstGeom>
+          <a:noFill/>
+        </p:spPr>
+        <p:txBody>
+          <a:bodyPr wrap="square" rtlCol="0">
+            <a:spAutoFit/>
+          </a:bodyPr>
+          <a:lstStyle/>
+          <a:p>
+            <a:r>
+              <a:rPr lang="en-US" sz="2800" dirty="0">
+                <a:solidFill>
+                  <a:srgbClr val="FF0000"/>
+                </a:solidFill>
+              </a:rPr>
+              <a:t>Figure 1: Approach Overview (This one is sample, you have to update for your projects)</a:t>
             </a:r>
           </a:p>
         </p:txBody>

</xml_diff>

<commit_message>
updated AST count in results
</commit_message>
<xml_diff>
--- a/Report/SURE_Poster.pptx
+++ b/Report/SURE_Poster.pptx
@@ -243,7 +243,7 @@
           <a:p>
             <a:fld id="{4AAD5197-33D8-404B-BB46-46338D5CAA86}" type="datetimeFigureOut">
               <a:rPr lang="en-US" smtClean="0"/>
-              <a:t>8/8/2025</a:t>
+              <a:t>8/10/2025</a:t>
             </a:fld>
             <a:endParaRPr lang="en-US"/>
           </a:p>
@@ -413,7 +413,7 @@
           <a:p>
             <a:fld id="{4AAD5197-33D8-404B-BB46-46338D5CAA86}" type="datetimeFigureOut">
               <a:rPr lang="en-US" smtClean="0"/>
-              <a:t>8/8/2025</a:t>
+              <a:t>8/10/2025</a:t>
             </a:fld>
             <a:endParaRPr lang="en-US"/>
           </a:p>
@@ -593,7 +593,7 @@
           <a:p>
             <a:fld id="{4AAD5197-33D8-404B-BB46-46338D5CAA86}" type="datetimeFigureOut">
               <a:rPr lang="en-US" smtClean="0"/>
-              <a:t>8/8/2025</a:t>
+              <a:t>8/10/2025</a:t>
             </a:fld>
             <a:endParaRPr lang="en-US"/>
           </a:p>
@@ -763,7 +763,7 @@
           <a:p>
             <a:fld id="{4AAD5197-33D8-404B-BB46-46338D5CAA86}" type="datetimeFigureOut">
               <a:rPr lang="en-US" smtClean="0"/>
-              <a:t>8/8/2025</a:t>
+              <a:t>8/10/2025</a:t>
             </a:fld>
             <a:endParaRPr lang="en-US"/>
           </a:p>
@@ -1009,7 +1009,7 @@
           <a:p>
             <a:fld id="{4AAD5197-33D8-404B-BB46-46338D5CAA86}" type="datetimeFigureOut">
               <a:rPr lang="en-US" smtClean="0"/>
-              <a:t>8/8/2025</a:t>
+              <a:t>8/10/2025</a:t>
             </a:fld>
             <a:endParaRPr lang="en-US"/>
           </a:p>
@@ -1241,7 +1241,7 @@
           <a:p>
             <a:fld id="{4AAD5197-33D8-404B-BB46-46338D5CAA86}" type="datetimeFigureOut">
               <a:rPr lang="en-US" smtClean="0"/>
-              <a:t>8/8/2025</a:t>
+              <a:t>8/10/2025</a:t>
             </a:fld>
             <a:endParaRPr lang="en-US"/>
           </a:p>
@@ -1608,7 +1608,7 @@
           <a:p>
             <a:fld id="{4AAD5197-33D8-404B-BB46-46338D5CAA86}" type="datetimeFigureOut">
               <a:rPr lang="en-US" smtClean="0"/>
-              <a:t>8/8/2025</a:t>
+              <a:t>8/10/2025</a:t>
             </a:fld>
             <a:endParaRPr lang="en-US"/>
           </a:p>
@@ -1726,7 +1726,7 @@
           <a:p>
             <a:fld id="{4AAD5197-33D8-404B-BB46-46338D5CAA86}" type="datetimeFigureOut">
               <a:rPr lang="en-US" smtClean="0"/>
-              <a:t>8/8/2025</a:t>
+              <a:t>8/10/2025</a:t>
             </a:fld>
             <a:endParaRPr lang="en-US"/>
           </a:p>
@@ -1821,7 +1821,7 @@
           <a:p>
             <a:fld id="{4AAD5197-33D8-404B-BB46-46338D5CAA86}" type="datetimeFigureOut">
               <a:rPr lang="en-US" smtClean="0"/>
-              <a:t>8/8/2025</a:t>
+              <a:t>8/10/2025</a:t>
             </a:fld>
             <a:endParaRPr lang="en-US"/>
           </a:p>
@@ -2098,7 +2098,7 @@
           <a:p>
             <a:fld id="{4AAD5197-33D8-404B-BB46-46338D5CAA86}" type="datetimeFigureOut">
               <a:rPr lang="en-US" smtClean="0"/>
-              <a:t>8/8/2025</a:t>
+              <a:t>8/10/2025</a:t>
             </a:fld>
             <a:endParaRPr lang="en-US"/>
           </a:p>
@@ -2355,7 +2355,7 @@
           <a:p>
             <a:fld id="{4AAD5197-33D8-404B-BB46-46338D5CAA86}" type="datetimeFigureOut">
               <a:rPr lang="en-US" smtClean="0"/>
-              <a:t>8/8/2025</a:t>
+              <a:t>8/10/2025</a:t>
             </a:fld>
             <a:endParaRPr lang="en-US"/>
           </a:p>
@@ -2568,7 +2568,7 @@
           <a:p>
             <a:fld id="{4AAD5197-33D8-404B-BB46-46338D5CAA86}" type="datetimeFigureOut">
               <a:rPr lang="en-US" smtClean="0"/>
-              <a:t>8/8/2025</a:t>
+              <a:t>8/10/2025</a:t>
             </a:fld>
             <a:endParaRPr lang="en-US"/>
           </a:p>
@@ -5041,19 +5041,7 @@
             </a:pPr>
             <a:r>
               <a:rPr lang="en-US" sz="4000" dirty="0"/>
-              <a:t>A total of </a:t>
-            </a:r>
-            <a:r>
-              <a:rPr lang="en-US" sz="4000" dirty="0">
-                <a:solidFill>
-                  <a:srgbClr val="FF0000"/>
-                </a:solidFill>
-              </a:rPr>
-              <a:t>###</a:t>
-            </a:r>
-            <a:r>
-              <a:rPr lang="en-US" sz="4000" dirty="0"/>
-              <a:t> ASTs were generated for use in pattern prediction</a:t>
+              <a:t>A total of 153 ASTs were generated for use in pattern prediction</a:t>
             </a:r>
           </a:p>
         </p:txBody>

</xml_diff>

<commit_message>
Fixed incorrect number for ASTs
</commit_message>
<xml_diff>
--- a/Report/SURE_Poster.pptx
+++ b/Report/SURE_Poster.pptx
@@ -5041,7 +5041,15 @@
             </a:pPr>
             <a:r>
               <a:rPr lang="en-US" sz="4000" dirty="0"/>
-              <a:t>A total of 153 ASTs were generated for use in pattern prediction</a:t>
+              <a:t>A total </a:t>
+            </a:r>
+            <a:r>
+              <a:rPr lang="en-US" sz="4000"/>
+              <a:t>of 122 </a:t>
+            </a:r>
+            <a:r>
+              <a:rPr lang="en-US" sz="4000" dirty="0"/>
+              <a:t>ASTs were generated for use in pattern prediction</a:t>
             </a:r>
           </a:p>
         </p:txBody>

</xml_diff>

<commit_message>
Adjusted font based on librarian feedback
</commit_message>
<xml_diff>
--- a/Report/SURE_Poster.pptx
+++ b/Report/SURE_Poster.pptx
@@ -243,7 +243,7 @@
           <a:p>
             <a:fld id="{4AAD5197-33D8-404B-BB46-46338D5CAA86}" type="datetimeFigureOut">
               <a:rPr lang="en-US" smtClean="0"/>
-              <a:t>8/10/2025</a:t>
+              <a:t>8/11/2025</a:t>
             </a:fld>
             <a:endParaRPr lang="en-US"/>
           </a:p>
@@ -413,7 +413,7 @@
           <a:p>
             <a:fld id="{4AAD5197-33D8-404B-BB46-46338D5CAA86}" type="datetimeFigureOut">
               <a:rPr lang="en-US" smtClean="0"/>
-              <a:t>8/10/2025</a:t>
+              <a:t>8/11/2025</a:t>
             </a:fld>
             <a:endParaRPr lang="en-US"/>
           </a:p>
@@ -593,7 +593,7 @@
           <a:p>
             <a:fld id="{4AAD5197-33D8-404B-BB46-46338D5CAA86}" type="datetimeFigureOut">
               <a:rPr lang="en-US" smtClean="0"/>
-              <a:t>8/10/2025</a:t>
+              <a:t>8/11/2025</a:t>
             </a:fld>
             <a:endParaRPr lang="en-US"/>
           </a:p>
@@ -763,7 +763,7 @@
           <a:p>
             <a:fld id="{4AAD5197-33D8-404B-BB46-46338D5CAA86}" type="datetimeFigureOut">
               <a:rPr lang="en-US" smtClean="0"/>
-              <a:t>8/10/2025</a:t>
+              <a:t>8/11/2025</a:t>
             </a:fld>
             <a:endParaRPr lang="en-US"/>
           </a:p>
@@ -1009,7 +1009,7 @@
           <a:p>
             <a:fld id="{4AAD5197-33D8-404B-BB46-46338D5CAA86}" type="datetimeFigureOut">
               <a:rPr lang="en-US" smtClean="0"/>
-              <a:t>8/10/2025</a:t>
+              <a:t>8/11/2025</a:t>
             </a:fld>
             <a:endParaRPr lang="en-US"/>
           </a:p>
@@ -1241,7 +1241,7 @@
           <a:p>
             <a:fld id="{4AAD5197-33D8-404B-BB46-46338D5CAA86}" type="datetimeFigureOut">
               <a:rPr lang="en-US" smtClean="0"/>
-              <a:t>8/10/2025</a:t>
+              <a:t>8/11/2025</a:t>
             </a:fld>
             <a:endParaRPr lang="en-US"/>
           </a:p>
@@ -1608,7 +1608,7 @@
           <a:p>
             <a:fld id="{4AAD5197-33D8-404B-BB46-46338D5CAA86}" type="datetimeFigureOut">
               <a:rPr lang="en-US" smtClean="0"/>
-              <a:t>8/10/2025</a:t>
+              <a:t>8/11/2025</a:t>
             </a:fld>
             <a:endParaRPr lang="en-US"/>
           </a:p>
@@ -1726,7 +1726,7 @@
           <a:p>
             <a:fld id="{4AAD5197-33D8-404B-BB46-46338D5CAA86}" type="datetimeFigureOut">
               <a:rPr lang="en-US" smtClean="0"/>
-              <a:t>8/10/2025</a:t>
+              <a:t>8/11/2025</a:t>
             </a:fld>
             <a:endParaRPr lang="en-US"/>
           </a:p>
@@ -1821,7 +1821,7 @@
           <a:p>
             <a:fld id="{4AAD5197-33D8-404B-BB46-46338D5CAA86}" type="datetimeFigureOut">
               <a:rPr lang="en-US" smtClean="0"/>
-              <a:t>8/10/2025</a:t>
+              <a:t>8/11/2025</a:t>
             </a:fld>
             <a:endParaRPr lang="en-US"/>
           </a:p>
@@ -2098,7 +2098,7 @@
           <a:p>
             <a:fld id="{4AAD5197-33D8-404B-BB46-46338D5CAA86}" type="datetimeFigureOut">
               <a:rPr lang="en-US" smtClean="0"/>
-              <a:t>8/10/2025</a:t>
+              <a:t>8/11/2025</a:t>
             </a:fld>
             <a:endParaRPr lang="en-US"/>
           </a:p>
@@ -2355,7 +2355,7 @@
           <a:p>
             <a:fld id="{4AAD5197-33D8-404B-BB46-46338D5CAA86}" type="datetimeFigureOut">
               <a:rPr lang="en-US" smtClean="0"/>
-              <a:t>8/10/2025</a:t>
+              <a:t>8/11/2025</a:t>
             </a:fld>
             <a:endParaRPr lang="en-US"/>
           </a:p>
@@ -2568,7 +2568,7 @@
           <a:p>
             <a:fld id="{4AAD5197-33D8-404B-BB46-46338D5CAA86}" type="datetimeFigureOut">
               <a:rPr lang="en-US" smtClean="0"/>
-              <a:t>8/10/2025</a:t>
+              <a:t>8/11/2025</a:t>
             </a:fld>
             <a:endParaRPr lang="en-US"/>
           </a:p>
@@ -2988,7 +2988,7 @@
         <p:spPr>
           <a:xfrm>
             <a:off x="696685" y="4764664"/>
-            <a:ext cx="8289348" cy="14077117"/>
+            <a:ext cx="8289348" cy="15419606"/>
           </a:xfrm>
           <a:prstGeom prst="roundRect">
             <a:avLst>
@@ -3156,6 +3156,30 @@
           </a:p>
           <a:p>
             <a:endParaRPr lang="en-US" dirty="0"/>
+          </a:p>
+          <a:p>
+            <a:endParaRPr lang="en-US" dirty="0"/>
+          </a:p>
+          <a:p>
+            <a:endParaRPr lang="en-US" dirty="0"/>
+          </a:p>
+          <a:p>
+            <a:endParaRPr lang="en-US" sz="1000" dirty="0"/>
+          </a:p>
+          <a:p>
+            <a:endParaRPr lang="en-US" sz="1000" dirty="0"/>
+          </a:p>
+          <a:p>
+            <a:endParaRPr lang="en-US" sz="1000" dirty="0"/>
+          </a:p>
+          <a:p>
+            <a:endParaRPr lang="en-US" sz="1000" dirty="0"/>
+          </a:p>
+          <a:p>
+            <a:endParaRPr lang="en-US" sz="1000" dirty="0"/>
+          </a:p>
+          <a:p>
+            <a:endParaRPr lang="en-US" sz="1000" dirty="0"/>
           </a:p>
         </p:txBody>
       </p:sp>
@@ -3235,7 +3259,7 @@
         </p:blipFill>
         <p:spPr bwMode="auto">
           <a:xfrm>
-            <a:off x="38154119" y="-337226"/>
+            <a:off x="38278810" y="-90623"/>
             <a:ext cx="6081033" cy="5101890"/>
           </a:xfrm>
           <a:prstGeom prst="rect">
@@ -3416,7 +3440,7 @@
         <p:spPr>
           <a:xfrm>
             <a:off x="914229" y="5992928"/>
-            <a:ext cx="7876150" cy="12765033"/>
+            <a:ext cx="7876150" cy="14380860"/>
           </a:xfrm>
           <a:prstGeom prst="rect">
             <a:avLst/>
@@ -3434,49 +3458,24 @@
               <a:buChar char="•"/>
             </a:pPr>
             <a:r>
-              <a:rPr lang="en-US" sz="3600" dirty="0"/>
+              <a:rPr lang="en-US" sz="3900" dirty="0"/>
               <a:t>CAN (Controller Area Network) protocol is the dominant intra-vehicle communications protocol in automotive applications</a:t>
             </a:r>
             <a:r>
-              <a:rPr lang="en-US" sz="3600" baseline="30000" dirty="0"/>
+              <a:rPr lang="en-US" sz="3900" baseline="30000" dirty="0"/>
               <a:t>1</a:t>
             </a:r>
             <a:r>
-              <a:rPr lang="en-US" sz="3600" dirty="0"/>
+              <a:rPr lang="en-US" sz="3900" dirty="0"/>
               <a:t>. </a:t>
             </a:r>
-          </a:p>
-          <a:p>
-            <a:endParaRPr lang="en-US" sz="1050" dirty="0"/>
           </a:p>
           <a:p>
             <a:pPr marL="571500" indent="-571500">
               <a:buFont typeface="Arial" panose="020B0604020202020204" pitchFamily="34" charset="0"/>
               <a:buChar char="•"/>
             </a:pPr>
-            <a:r>
-              <a:rPr lang="en-US" sz="3600" dirty="0"/>
-              <a:t>While the protocol itself is standardized by bodies like ISO</a:t>
-            </a:r>
-            <a:r>
-              <a:rPr lang="en-US" sz="3600" baseline="30000" dirty="0"/>
-              <a:t>2</a:t>
-            </a:r>
-            <a:r>
-              <a:rPr lang="en-US" sz="3600" dirty="0"/>
-              <a:t> (International Standards Organization) and SAE</a:t>
-            </a:r>
-            <a:r>
-              <a:rPr lang="en-US" sz="3600" baseline="30000" dirty="0"/>
-              <a:t>3</a:t>
-            </a:r>
-            <a:r>
-              <a:rPr lang="en-US" sz="3600" dirty="0"/>
-              <a:t> (Society of Automotive Engineers), development tools vary wildly.</a:t>
-            </a:r>
-          </a:p>
-          <a:p>
-            <a:endParaRPr lang="en-US" sz="1050" dirty="0"/>
+            <a:endParaRPr lang="en-US" sz="800" dirty="0"/>
           </a:p>
           <a:p>
             <a:pPr marL="571500" indent="-571500">
@@ -3484,8 +3483,24 @@
               <a:buChar char="•"/>
             </a:pPr>
             <a:r>
-              <a:rPr lang="en-US" sz="3600" dirty="0"/>
-              <a:t>Lack of standard development tools can lead to confusion when working with different software vendor APIs (Application Protocol Interfaces) or ECU (Electronic Control Unit) Suppliers </a:t>
+              <a:rPr lang="en-US" sz="3900" dirty="0"/>
+              <a:t>While the protocol itself is standardized by bodies like ISO</a:t>
+            </a:r>
+            <a:r>
+              <a:rPr lang="en-US" sz="3900" baseline="30000" dirty="0"/>
+              <a:t>2</a:t>
+            </a:r>
+            <a:r>
+              <a:rPr lang="en-US" sz="3900" dirty="0"/>
+              <a:t> (International Standards Organization) and SAE</a:t>
+            </a:r>
+            <a:r>
+              <a:rPr lang="en-US" sz="3900" baseline="30000" dirty="0"/>
+              <a:t>3</a:t>
+            </a:r>
+            <a:r>
+              <a:rPr lang="en-US" sz="3900" dirty="0"/>
+              <a:t> (Society of Automotive Engineers), development tools vary wildly.</a:t>
             </a:r>
           </a:p>
           <a:p>
@@ -3493,7 +3508,7 @@
               <a:buFont typeface="Arial" panose="020B0604020202020204" pitchFamily="34" charset="0"/>
               <a:buChar char="•"/>
             </a:pPr>
-            <a:endParaRPr lang="en-US" sz="1050" dirty="0"/>
+            <a:endParaRPr lang="en-US" sz="800" dirty="0"/>
           </a:p>
           <a:p>
             <a:pPr marL="571500" indent="-571500">
@@ -3501,7 +3516,24 @@
               <a:buChar char="•"/>
             </a:pPr>
             <a:r>
-              <a:rPr lang="en-US" sz="3600" dirty="0"/>
+              <a:rPr lang="en-US" sz="3900" dirty="0"/>
+              <a:t>Lack of standard development tools can lead to confusion when working with different software vendor APIs (Application Protocol Interfaces) or ECU (Electronic Control Unit) Suppliers </a:t>
+            </a:r>
+          </a:p>
+          <a:p>
+            <a:pPr marL="571500" indent="-571500">
+              <a:buFont typeface="Arial" panose="020B0604020202020204" pitchFamily="34" charset="0"/>
+              <a:buChar char="•"/>
+            </a:pPr>
+            <a:endParaRPr lang="en-US" sz="800" dirty="0"/>
+          </a:p>
+          <a:p>
+            <a:pPr marL="571500" indent="-571500">
+              <a:buFont typeface="Arial" panose="020B0604020202020204" pitchFamily="34" charset="0"/>
+              <a:buChar char="•"/>
+            </a:pPr>
+            <a:r>
+              <a:rPr lang="en-US" sz="3900" dirty="0"/>
               <a:t>Resources to unify different development tools may increase productivity and foster innovation through market competition by increasing accessibility and ease of development for CAN systems</a:t>
             </a:r>
           </a:p>
@@ -3521,8 +3553,8 @@
         </p:nvSpPr>
         <p:spPr>
           <a:xfrm>
-            <a:off x="696685" y="19003840"/>
-            <a:ext cx="8289348" cy="5270659"/>
+            <a:off x="696685" y="20373788"/>
+            <a:ext cx="8289348" cy="5615761"/>
           </a:xfrm>
           <a:prstGeom prst="roundRect">
             <a:avLst>
@@ -3631,6 +3663,12 @@
           <a:p>
             <a:endParaRPr lang="en-US" sz="1100" dirty="0"/>
           </a:p>
+          <a:p>
+            <a:endParaRPr lang="en-US" sz="1100" dirty="0"/>
+          </a:p>
+          <a:p>
+            <a:endParaRPr lang="en-US" sz="1100" dirty="0"/>
+          </a:p>
         </p:txBody>
       </p:sp>
       <p:sp>
@@ -3647,7 +3685,7 @@
         </p:nvSpPr>
         <p:spPr>
           <a:xfrm>
-            <a:off x="914230" y="19165899"/>
+            <a:off x="914230" y="20535847"/>
             <a:ext cx="7876150" cy="1066205"/>
           </a:xfrm>
           <a:prstGeom prst="roundRect">
@@ -3693,8 +3731,8 @@
         </p:nvSpPr>
         <p:spPr>
           <a:xfrm>
-            <a:off x="914229" y="20232104"/>
-            <a:ext cx="7876150" cy="3970318"/>
+            <a:off x="914229" y="21602052"/>
+            <a:ext cx="7876150" cy="4401205"/>
           </a:xfrm>
           <a:prstGeom prst="rect">
             <a:avLst/>
@@ -3708,7 +3746,7 @@
           <a:lstStyle/>
           <a:p>
             <a:r>
-              <a:rPr lang="en-US" sz="3600" dirty="0"/>
+              <a:rPr lang="en-US" sz="4000" dirty="0"/>
               <a:t>The purpose of this project was to develop a static analysis tool to boost productivity for development and debugging of CAN related applications in various usage scenarios, irrespective of APIs or development tools used.</a:t>
             </a:r>
           </a:p>
@@ -3728,8 +3766,8 @@
         </p:nvSpPr>
         <p:spPr>
           <a:xfrm>
-            <a:off x="696685" y="24436558"/>
-            <a:ext cx="8289348" cy="7937361"/>
+            <a:off x="687007" y="26161695"/>
+            <a:ext cx="8289348" cy="6183987"/>
           </a:xfrm>
           <a:prstGeom prst="roundRect">
             <a:avLst>
@@ -3803,24 +3841,6 @@
             <a:endParaRPr lang="en-US" dirty="0"/>
           </a:p>
           <a:p>
-            <a:endParaRPr lang="en-US" dirty="0"/>
-          </a:p>
-          <a:p>
-            <a:endParaRPr lang="en-US" dirty="0"/>
-          </a:p>
-          <a:p>
-            <a:endParaRPr lang="en-US" dirty="0"/>
-          </a:p>
-          <a:p>
-            <a:endParaRPr lang="en-US" dirty="0"/>
-          </a:p>
-          <a:p>
-            <a:endParaRPr lang="en-US" dirty="0"/>
-          </a:p>
-          <a:p>
-            <a:endParaRPr lang="en-US" dirty="0"/>
-          </a:p>
-          <a:p>
             <a:endParaRPr lang="en-US" sz="1000" dirty="0"/>
           </a:p>
           <a:p>
@@ -3854,7 +3874,7 @@
         </p:nvSpPr>
         <p:spPr>
           <a:xfrm>
-            <a:off x="914229" y="24645162"/>
+            <a:off x="898437" y="26308333"/>
             <a:ext cx="7876150" cy="1066205"/>
           </a:xfrm>
           <a:prstGeom prst="roundRect">
@@ -3900,8 +3920,8 @@
         </p:nvSpPr>
         <p:spPr>
           <a:xfrm>
-            <a:off x="914229" y="25672490"/>
-            <a:ext cx="7876150" cy="6740307"/>
+            <a:off x="898437" y="27268212"/>
+            <a:ext cx="7876150" cy="5016758"/>
           </a:xfrm>
           <a:prstGeom prst="rect">
             <a:avLst/>
@@ -3919,8 +3939,8 @@
               <a:buChar char="•"/>
             </a:pPr>
             <a:r>
-              <a:rPr lang="en-US" sz="3600" dirty="0"/>
-              <a:t>Navigated between various programming languages with ease.</a:t>
+              <a:rPr lang="en-US" sz="4000" dirty="0"/>
+              <a:t>Developed new automation tools while still utilizing existing tools and methods to boost productivity.</a:t>
             </a:r>
           </a:p>
           <a:p>
@@ -3929,28 +3949,8 @@
               <a:buChar char="•"/>
             </a:pPr>
             <a:r>
-              <a:rPr lang="en-US" sz="3600" dirty="0"/>
-              <a:t>Developed new automation tools while still utilizing existing tools and methods to boost productivity.</a:t>
-            </a:r>
-          </a:p>
-          <a:p>
-            <a:pPr marL="571500" indent="-571500">
-              <a:buFont typeface="Arial" panose="020B0604020202020204" pitchFamily="34" charset="0"/>
-              <a:buChar char="•"/>
-            </a:pPr>
-            <a:r>
-              <a:rPr lang="en-US" sz="3600" dirty="0"/>
+              <a:rPr lang="en-US" sz="4000" dirty="0"/>
               <a:t>Studied existing development technologies to understand how they can be leveraged for use in future technologies.</a:t>
-            </a:r>
-          </a:p>
-          <a:p>
-            <a:pPr marL="571500" indent="-571500">
-              <a:buFont typeface="Arial" panose="020B0604020202020204" pitchFamily="34" charset="0"/>
-              <a:buChar char="•"/>
-            </a:pPr>
-            <a:r>
-              <a:rPr lang="en-US" sz="3600" dirty="0"/>
-              <a:t>Learned, implemented, and troubleshooted new mechanisms for faster knowledge collection.</a:t>
             </a:r>
           </a:p>
         </p:txBody>
@@ -4462,7 +4462,7 @@
                   <a:schemeClr val="bg1"/>
                 </a:solidFill>
               </a:rPr>
-              <a:t>TABLES &amp; FIGURES</a:t>
+              <a:t>FIGURES</a:t>
             </a:r>
           </a:p>
         </p:txBody>
@@ -5041,15 +5041,7 @@
             </a:pPr>
             <a:r>
               <a:rPr lang="en-US" sz="4000" dirty="0"/>
-              <a:t>A total </a:t>
-            </a:r>
-            <a:r>
-              <a:rPr lang="en-US" sz="4000"/>
-              <a:t>of 122 </a:t>
-            </a:r>
-            <a:r>
-              <a:rPr lang="en-US" sz="4000" dirty="0"/>
-              <a:t>ASTs were generated for use in pattern prediction</a:t>
+              <a:t>A total of 122 ASTs were generated for use in pattern prediction</a:t>
             </a:r>
           </a:p>
         </p:txBody>

</xml_diff>